<commit_message>
last callfor take off
</commit_message>
<xml_diff>
--- a/docs/abbildungen/20160330_rest.pptx
+++ b/docs/abbildungen/20160330_rest.pptx
@@ -3153,7 +3153,7 @@
         <p:spPr>
           <a:xfrm>
             <a:off x="1255363" y="-1"/>
-            <a:ext cx="9000000" cy="6364286"/>
+            <a:ext cx="9000000" cy="3962401"/>
           </a:xfrm>
           <a:prstGeom prst="rect">
             <a:avLst/>
@@ -3240,13 +3240,13 @@
       </p:sp>
       <p:pic>
         <p:nvPicPr>
-          <p:cNvPr id="2" name="Bild 1"/>
+          <p:cNvPr id="6" name="Bild 5"/>
           <p:cNvPicPr>
             <a:picLocks noChangeAspect="1"/>
           </p:cNvPicPr>
           <p:nvPr/>
         </p:nvPicPr>
-        <p:blipFill>
+        <p:blipFill rotWithShape="1">
           <a:blip r:embed="rId2">
             <a:extLst>
               <a:ext uri="{28A0092B-C50C-407E-A947-70E740481C1C}">
@@ -3254,14 +3254,37 @@
               </a:ext>
             </a:extLst>
           </a:blip>
+          <a:srcRect l="4258" t="311" r="2518" b="568"/>
+          <a:stretch/>
+        </p:blipFill>
+        <p:spPr>
+          <a:xfrm>
+            <a:off x="3603811" y="125502"/>
+            <a:ext cx="4300579" cy="3776791"/>
+          </a:xfrm>
+          <a:prstGeom prst="rect">
+            <a:avLst/>
+          </a:prstGeom>
+        </p:spPr>
+      </p:pic>
+      <p:pic>
+        <p:nvPicPr>
+          <p:cNvPr id="8" name="Bild 7"/>
+          <p:cNvPicPr>
+            <a:picLocks noChangeAspect="1"/>
+          </p:cNvPicPr>
+          <p:nvPr/>
+        </p:nvPicPr>
+        <p:blipFill>
+          <a:blip r:embed="rId3"/>
           <a:stretch>
             <a:fillRect/>
           </a:stretch>
         </p:blipFill>
         <p:spPr>
           <a:xfrm>
-            <a:off x="3197187" y="0"/>
-            <a:ext cx="5116352" cy="3598925"/>
+            <a:off x="1587500" y="1441450"/>
+            <a:ext cx="9017000" cy="3975100"/>
           </a:xfrm>
           <a:prstGeom prst="rect">
             <a:avLst/>
@@ -3309,6 +3332,306 @@
         <p:spPr>
           <a:xfrm>
             <a:off x="1255363" y="-1"/>
+            <a:ext cx="9000000" cy="5221706"/>
+          </a:xfrm>
+          <a:prstGeom prst="rect">
+            <a:avLst/>
+          </a:prstGeom>
+          <a:noFill/>
+          <a:ln>
+            <a:solidFill>
+              <a:schemeClr val="tx1"/>
+            </a:solidFill>
+          </a:ln>
+        </p:spPr>
+        <p:style>
+          <a:lnRef idx="2">
+            <a:schemeClr val="accent1">
+              <a:shade val="50000"/>
+            </a:schemeClr>
+          </a:lnRef>
+          <a:fillRef idx="1">
+            <a:schemeClr val="accent1"/>
+          </a:fillRef>
+          <a:effectRef idx="0">
+            <a:schemeClr val="accent1"/>
+          </a:effectRef>
+          <a:fontRef idx="minor">
+            <a:schemeClr val="lt1"/>
+          </a:fontRef>
+        </p:style>
+        <p:txBody>
+          <a:bodyPr rtlCol="0" anchor="ctr"/>
+          <a:lstStyle/>
+          <a:p>
+            <a:pPr algn="ctr"/>
+            <a:endParaRPr lang="de-DE"/>
+          </a:p>
+        </p:txBody>
+      </p:sp>
+      <p:sp>
+        <p:nvSpPr>
+          <p:cNvPr id="12" name="Rechteck 11"/>
+          <p:cNvSpPr/>
+          <p:nvPr/>
+        </p:nvSpPr>
+        <p:spPr>
+          <a:xfrm>
+            <a:off x="1435363" y="4239124"/>
+            <a:ext cx="8640000" cy="828000"/>
+          </a:xfrm>
+          <a:prstGeom prst="rect">
+            <a:avLst/>
+          </a:prstGeom>
+          <a:solidFill>
+            <a:schemeClr val="bg1"/>
+          </a:solidFill>
+          <a:ln>
+            <a:solidFill>
+              <a:schemeClr val="tx1"/>
+            </a:solidFill>
+          </a:ln>
+        </p:spPr>
+        <p:style>
+          <a:lnRef idx="2">
+            <a:schemeClr val="accent1">
+              <a:shade val="50000"/>
+            </a:schemeClr>
+          </a:lnRef>
+          <a:fillRef idx="1">
+            <a:schemeClr val="accent1"/>
+          </a:fillRef>
+          <a:effectRef idx="0">
+            <a:schemeClr val="accent1"/>
+          </a:effectRef>
+          <a:fontRef idx="minor">
+            <a:schemeClr val="lt1"/>
+          </a:fontRef>
+        </p:style>
+        <p:txBody>
+          <a:bodyPr rtlCol="0" anchor="ctr"/>
+          <a:lstStyle/>
+          <a:p>
+            <a:pPr algn="ctr"/>
+            <a:r>
+              <a:rPr lang="de-DE" dirty="0" smtClean="0"/>
+              <a:t>a</a:t>
+            </a:r>
+            <a:endParaRPr lang="de-DE" dirty="0"/>
+          </a:p>
+        </p:txBody>
+      </p:sp>
+      <p:pic>
+        <p:nvPicPr>
+          <p:cNvPr id="5" name="Bild 4"/>
+          <p:cNvPicPr>
+            <a:picLocks noChangeAspect="1"/>
+          </p:cNvPicPr>
+          <p:nvPr/>
+        </p:nvPicPr>
+        <p:blipFill rotWithShape="1">
+          <a:blip r:embed="rId2">
+            <a:extLst>
+              <a:ext uri="{28A0092B-C50C-407E-A947-70E740481C1C}">
+                <a14:useLocalDpi xmlns:a14="http://schemas.microsoft.com/office/drawing/2010/main" val="0"/>
+              </a:ext>
+            </a:extLst>
+          </a:blip>
+          <a:srcRect t="3466"/>
+          <a:stretch/>
+        </p:blipFill>
+        <p:spPr>
+          <a:xfrm>
+            <a:off x="1308100" y="36087"/>
+            <a:ext cx="8947264" cy="3946358"/>
+          </a:xfrm>
+          <a:prstGeom prst="rect">
+            <a:avLst/>
+          </a:prstGeom>
+        </p:spPr>
+      </p:pic>
+      <p:pic>
+        <p:nvPicPr>
+          <p:cNvPr id="6" name="Bild 5"/>
+          <p:cNvPicPr>
+            <a:picLocks noChangeAspect="1"/>
+          </p:cNvPicPr>
+          <p:nvPr/>
+        </p:nvPicPr>
+        <p:blipFill>
+          <a:blip r:embed="rId3"/>
+          <a:stretch>
+            <a:fillRect/>
+          </a:stretch>
+        </p:blipFill>
+        <p:spPr>
+          <a:xfrm>
+            <a:off x="1284972" y="772995"/>
+            <a:ext cx="139700" cy="1866900"/>
+          </a:xfrm>
+          <a:prstGeom prst="rect">
+            <a:avLst/>
+          </a:prstGeom>
+        </p:spPr>
+      </p:pic>
+      <p:pic>
+        <p:nvPicPr>
+          <p:cNvPr id="7" name="Bild 6"/>
+          <p:cNvPicPr>
+            <a:picLocks noChangeAspect="1"/>
+          </p:cNvPicPr>
+          <p:nvPr/>
+        </p:nvPicPr>
+        <p:blipFill>
+          <a:blip r:embed="rId4"/>
+          <a:stretch>
+            <a:fillRect/>
+          </a:stretch>
+        </p:blipFill>
+        <p:spPr>
+          <a:xfrm>
+            <a:off x="5968958" y="4005705"/>
+            <a:ext cx="567066" cy="147930"/>
+          </a:xfrm>
+          <a:prstGeom prst="rect">
+            <a:avLst/>
+          </a:prstGeom>
+        </p:spPr>
+      </p:pic>
+      <p:pic>
+        <p:nvPicPr>
+          <p:cNvPr id="8" name="Bild 7"/>
+          <p:cNvPicPr>
+            <a:picLocks noChangeAspect="1"/>
+          </p:cNvPicPr>
+          <p:nvPr/>
+        </p:nvPicPr>
+        <p:blipFill rotWithShape="1">
+          <a:blip r:embed="rId5"/>
+          <a:srcRect l="63458" t="-28625" r="11417" b="-5248"/>
+          <a:stretch/>
+        </p:blipFill>
+        <p:spPr>
+          <a:xfrm>
+            <a:off x="1462779" y="4236938"/>
+            <a:ext cx="1557148" cy="323029"/>
+          </a:xfrm>
+          <a:prstGeom prst="rect">
+            <a:avLst/>
+          </a:prstGeom>
+        </p:spPr>
+      </p:pic>
+      <p:sp>
+        <p:nvSpPr>
+          <p:cNvPr id="3" name="Textfeld 2"/>
+          <p:cNvSpPr txBox="1"/>
+          <p:nvPr/>
+        </p:nvSpPr>
+        <p:spPr>
+          <a:xfrm>
+            <a:off x="2958306" y="4283792"/>
+            <a:ext cx="1757212" cy="261610"/>
+          </a:xfrm>
+          <a:prstGeom prst="rect">
+            <a:avLst/>
+          </a:prstGeom>
+          <a:noFill/>
+        </p:spPr>
+        <p:txBody>
+          <a:bodyPr wrap="none" rtlCol="0">
+            <a:spAutoFit/>
+          </a:bodyPr>
+          <a:lstStyle/>
+          <a:p>
+            <a:r>
+              <a:rPr lang="de-DE" sz="1100">
+                <a:latin typeface="Avenir Medium" charset="0"/>
+                <a:ea typeface="Avenir Medium" charset="0"/>
+                <a:cs typeface="Avenir Medium" charset="0"/>
+              </a:rPr>
+              <a:t>a</a:t>
+            </a:r>
+            <a:r>
+              <a:rPr lang="de-DE" sz="1100" smtClean="0">
+                <a:latin typeface="Avenir Medium" charset="0"/>
+                <a:ea typeface="Avenir Medium" charset="0"/>
+                <a:cs typeface="Avenir Medium" charset="0"/>
+              </a:rPr>
+              <a:t>b 11.02.2016 ab 15:50h</a:t>
+            </a:r>
+            <a:endParaRPr lang="de-DE" sz="1100">
+              <a:latin typeface="Avenir Medium" charset="0"/>
+              <a:ea typeface="Avenir Medium" charset="0"/>
+              <a:cs typeface="Avenir Medium" charset="0"/>
+            </a:endParaRPr>
+          </a:p>
+        </p:txBody>
+      </p:sp>
+      <p:pic>
+        <p:nvPicPr>
+          <p:cNvPr id="9" name="Bild 8"/>
+          <p:cNvPicPr>
+            <a:picLocks noChangeAspect="1"/>
+          </p:cNvPicPr>
+          <p:nvPr/>
+        </p:nvPicPr>
+        <p:blipFill>
+          <a:blip r:embed="rId6"/>
+          <a:stretch>
+            <a:fillRect/>
+          </a:stretch>
+        </p:blipFill>
+        <p:spPr>
+          <a:xfrm>
+            <a:off x="1587500" y="812800"/>
+            <a:ext cx="9017000" cy="5232400"/>
+          </a:xfrm>
+          <a:prstGeom prst="rect">
+            <a:avLst/>
+          </a:prstGeom>
+        </p:spPr>
+      </p:pic>
+    </p:spTree>
+    <p:extLst>
+      <p:ext uri="{BB962C8B-B14F-4D97-AF65-F5344CB8AC3E}">
+        <p14:creationId xmlns:p14="http://schemas.microsoft.com/office/powerpoint/2010/main" val="545873950"/>
+      </p:ext>
+    </p:extLst>
+  </p:cSld>
+  <p:clrMapOvr>
+    <a:masterClrMapping/>
+  </p:clrMapOvr>
+</p:sld>
+</file>
+
+<file path=ppt/slides/slide3.xml><?xml version="1.0" encoding="utf-8"?>
+<p:sld xmlns:a="http://schemas.openxmlformats.org/drawingml/2006/main" xmlns:r="http://schemas.openxmlformats.org/officeDocument/2006/relationships" xmlns:p="http://schemas.openxmlformats.org/presentationml/2006/main">
+  <p:cSld>
+    <p:spTree>
+      <p:nvGrpSpPr>
+        <p:cNvPr id="1" name=""/>
+        <p:cNvGrpSpPr/>
+        <p:nvPr/>
+      </p:nvGrpSpPr>
+      <p:grpSpPr>
+        <a:xfrm>
+          <a:off x="0" y="0"/>
+          <a:ext cx="0" cy="0"/>
+          <a:chOff x="0" y="0"/>
+          <a:chExt cx="0" cy="0"/>
+        </a:xfrm>
+      </p:grpSpPr>
+      <p:sp>
+        <p:nvSpPr>
+          <p:cNvPr id="4" name="Rechteck 3"/>
+          <p:cNvSpPr>
+            <a:spLocks noChangeAspect="1"/>
+          </p:cNvSpPr>
+          <p:nvPr/>
+        </p:nvSpPr>
+        <p:spPr>
+          <a:xfrm>
+            <a:off x="1255363" y="-1"/>
             <a:ext cx="9000000" cy="6364286"/>
           </a:xfrm>
           <a:prstGeom prst="rect">
@@ -3394,132 +3717,6 @@
           </a:p>
         </p:txBody>
       </p:sp>
-    </p:spTree>
-    <p:extLst>
-      <p:ext uri="{BB962C8B-B14F-4D97-AF65-F5344CB8AC3E}">
-        <p14:creationId xmlns:p14="http://schemas.microsoft.com/office/powerpoint/2010/main" val="545873950"/>
-      </p:ext>
-    </p:extLst>
-  </p:cSld>
-  <p:clrMapOvr>
-    <a:masterClrMapping/>
-  </p:clrMapOvr>
-</p:sld>
-</file>
-
-<file path=ppt/slides/slide3.xml><?xml version="1.0" encoding="utf-8"?>
-<p:sld xmlns:a="http://schemas.openxmlformats.org/drawingml/2006/main" xmlns:r="http://schemas.openxmlformats.org/officeDocument/2006/relationships" xmlns:p="http://schemas.openxmlformats.org/presentationml/2006/main">
-  <p:cSld>
-    <p:spTree>
-      <p:nvGrpSpPr>
-        <p:cNvPr id="1" name=""/>
-        <p:cNvGrpSpPr/>
-        <p:nvPr/>
-      </p:nvGrpSpPr>
-      <p:grpSpPr>
-        <a:xfrm>
-          <a:off x="0" y="0"/>
-          <a:ext cx="0" cy="0"/>
-          <a:chOff x="0" y="0"/>
-          <a:chExt cx="0" cy="0"/>
-        </a:xfrm>
-      </p:grpSpPr>
-      <p:sp>
-        <p:nvSpPr>
-          <p:cNvPr id="4" name="Rechteck 3"/>
-          <p:cNvSpPr>
-            <a:spLocks noChangeAspect="1"/>
-          </p:cNvSpPr>
-          <p:nvPr/>
-        </p:nvSpPr>
-        <p:spPr>
-          <a:xfrm>
-            <a:off x="1255363" y="-1"/>
-            <a:ext cx="9000000" cy="6364286"/>
-          </a:xfrm>
-          <a:prstGeom prst="rect">
-            <a:avLst/>
-          </a:prstGeom>
-          <a:noFill/>
-          <a:ln>
-            <a:solidFill>
-              <a:schemeClr val="tx1"/>
-            </a:solidFill>
-          </a:ln>
-        </p:spPr>
-        <p:style>
-          <a:lnRef idx="2">
-            <a:schemeClr val="accent1">
-              <a:shade val="50000"/>
-            </a:schemeClr>
-          </a:lnRef>
-          <a:fillRef idx="1">
-            <a:schemeClr val="accent1"/>
-          </a:fillRef>
-          <a:effectRef idx="0">
-            <a:schemeClr val="accent1"/>
-          </a:effectRef>
-          <a:fontRef idx="minor">
-            <a:schemeClr val="lt1"/>
-          </a:fontRef>
-        </p:style>
-        <p:txBody>
-          <a:bodyPr rtlCol="0" anchor="ctr"/>
-          <a:lstStyle/>
-          <a:p>
-            <a:pPr algn="ctr"/>
-            <a:endParaRPr lang="de-DE"/>
-          </a:p>
-        </p:txBody>
-      </p:sp>
-      <p:sp>
-        <p:nvSpPr>
-          <p:cNvPr id="12" name="Rechteck 11"/>
-          <p:cNvSpPr/>
-          <p:nvPr/>
-        </p:nvSpPr>
-        <p:spPr>
-          <a:xfrm>
-            <a:off x="1435363" y="5334000"/>
-            <a:ext cx="8640000" cy="828000"/>
-          </a:xfrm>
-          <a:prstGeom prst="rect">
-            <a:avLst/>
-          </a:prstGeom>
-          <a:solidFill>
-            <a:schemeClr val="bg1"/>
-          </a:solidFill>
-          <a:ln>
-            <a:solidFill>
-              <a:schemeClr val="tx1"/>
-            </a:solidFill>
-          </a:ln>
-        </p:spPr>
-        <p:style>
-          <a:lnRef idx="2">
-            <a:schemeClr val="accent1">
-              <a:shade val="50000"/>
-            </a:schemeClr>
-          </a:lnRef>
-          <a:fillRef idx="1">
-            <a:schemeClr val="accent1"/>
-          </a:fillRef>
-          <a:effectRef idx="0">
-            <a:schemeClr val="accent1"/>
-          </a:effectRef>
-          <a:fontRef idx="minor">
-            <a:schemeClr val="lt1"/>
-          </a:fontRef>
-        </p:style>
-        <p:txBody>
-          <a:bodyPr rtlCol="0" anchor="ctr"/>
-          <a:lstStyle/>
-          <a:p>
-            <a:pPr algn="ctr"/>
-            <a:endParaRPr lang="de-DE"/>
-          </a:p>
-        </p:txBody>
-      </p:sp>
       <p:pic>
         <p:nvPicPr>
           <p:cNvPr id="2" name="Bild 1"/>
@@ -3544,36 +3741,6 @@
           <a:xfrm>
             <a:off x="892119" y="209216"/>
             <a:ext cx="8178800" cy="5753100"/>
-          </a:xfrm>
-          <a:prstGeom prst="rect">
-            <a:avLst/>
-          </a:prstGeom>
-        </p:spPr>
-      </p:pic>
-      <p:pic>
-        <p:nvPicPr>
-          <p:cNvPr id="3" name="Bild 2"/>
-          <p:cNvPicPr>
-            <a:picLocks noChangeAspect="1"/>
-          </p:cNvPicPr>
-          <p:nvPr/>
-        </p:nvPicPr>
-        <p:blipFill>
-          <a:blip r:embed="rId3">
-            <a:extLst>
-              <a:ext uri="{28A0092B-C50C-407E-A947-70E740481C1C}">
-                <a14:useLocalDpi xmlns:a14="http://schemas.microsoft.com/office/drawing/2010/main" val="0"/>
-              </a:ext>
-            </a:extLst>
-          </a:blip>
-          <a:stretch>
-            <a:fillRect/>
-          </a:stretch>
-        </p:blipFill>
-        <p:spPr>
-          <a:xfrm>
-            <a:off x="0" y="1648401"/>
-            <a:ext cx="12192000" cy="5570546"/>
           </a:xfrm>
           <a:prstGeom prst="rect">
             <a:avLst/>

</xml_diff>